<commit_message>
corrections/improvements to a couple of slides
</commit_message>
<xml_diff>
--- a/PowerPoints/04 - Definition of CPRL.pptx
+++ b/PowerPoints/04 - Definition of CPRL.pptx
@@ -7035,7 +7035,17 @@
           <a:p>
             <a:r>
               <a:rPr lang="en-US" dirty="0"/>
-              <a:t>CPRL also permits an optional for prefix for a loop.</a:t>
+              <a:t>CPRL also permits an optional “</a:t>
+            </a:r>
+            <a:r>
+              <a:rPr lang="en-US" dirty="0">
+                <a:latin typeface="Consolas" panose="020B0609020204030204" pitchFamily="49" charset="0"/>
+              </a:rPr>
+              <a:t>for</a:t>
+            </a:r>
+            <a:r>
+              <a:rPr lang="en-US" dirty="0"/>
+              <a:t>” prefix for a loop.</a:t>
             </a:r>
           </a:p>
           <a:p>

</xml_diff>